<commit_message>
small update in lesson 3
</commit_message>
<xml_diff>
--- a/M2/Skill/3-Git and Unity/3-Git en Unity.pptx
+++ b/M2/Skill/3-Git and Unity/3-Git en Unity.pptx
@@ -273,7 +273,7 @@
           <a:p>
             <a:fld id="{545DE63F-B6A1-4286-98E5-30D0A12D3C8D}" type="datetimeFigureOut">
               <a:rPr lang="nl-NL" smtClean="0"/>
-              <a:t>2-12-2024</a:t>
+              <a:t>03-12-2024</a:t>
             </a:fld>
             <a:endParaRPr lang="nl-NL"/>
           </a:p>
@@ -327,7 +327,7 @@
           <a:p>
             <a:fld id="{D108F25D-CB0B-4DCB-B2CB-040B5AFE7CE3}" type="slidenum">
               <a:rPr lang="nl-NL" smtClean="0"/>
-              <a:t>‹nr.›</a:t>
+              <a:t>‹#›</a:t>
             </a:fld>
             <a:endParaRPr lang="nl-NL"/>
           </a:p>
@@ -471,7 +471,7 @@
           <a:p>
             <a:fld id="{545DE63F-B6A1-4286-98E5-30D0A12D3C8D}" type="datetimeFigureOut">
               <a:rPr lang="nl-NL" smtClean="0"/>
-              <a:t>2-12-2024</a:t>
+              <a:t>03-12-2024</a:t>
             </a:fld>
             <a:endParaRPr lang="nl-NL"/>
           </a:p>
@@ -525,7 +525,7 @@
           <a:p>
             <a:fld id="{D108F25D-CB0B-4DCB-B2CB-040B5AFE7CE3}" type="slidenum">
               <a:rPr lang="nl-NL" smtClean="0"/>
-              <a:t>‹nr.›</a:t>
+              <a:t>‹#›</a:t>
             </a:fld>
             <a:endParaRPr lang="nl-NL"/>
           </a:p>
@@ -679,7 +679,7 @@
           <a:p>
             <a:fld id="{545DE63F-B6A1-4286-98E5-30D0A12D3C8D}" type="datetimeFigureOut">
               <a:rPr lang="nl-NL" smtClean="0"/>
-              <a:t>2-12-2024</a:t>
+              <a:t>03-12-2024</a:t>
             </a:fld>
             <a:endParaRPr lang="nl-NL"/>
           </a:p>
@@ -733,7 +733,7 @@
           <a:p>
             <a:fld id="{D108F25D-CB0B-4DCB-B2CB-040B5AFE7CE3}" type="slidenum">
               <a:rPr lang="nl-NL" smtClean="0"/>
-              <a:t>‹nr.›</a:t>
+              <a:t>‹#›</a:t>
             </a:fld>
             <a:endParaRPr lang="nl-NL"/>
           </a:p>
@@ -877,7 +877,7 @@
           <a:p>
             <a:fld id="{545DE63F-B6A1-4286-98E5-30D0A12D3C8D}" type="datetimeFigureOut">
               <a:rPr lang="nl-NL" smtClean="0"/>
-              <a:t>2-12-2024</a:t>
+              <a:t>03-12-2024</a:t>
             </a:fld>
             <a:endParaRPr lang="nl-NL"/>
           </a:p>
@@ -931,7 +931,7 @@
           <a:p>
             <a:fld id="{D108F25D-CB0B-4DCB-B2CB-040B5AFE7CE3}" type="slidenum">
               <a:rPr lang="nl-NL" smtClean="0"/>
-              <a:t>‹nr.›</a:t>
+              <a:t>‹#›</a:t>
             </a:fld>
             <a:endParaRPr lang="nl-NL"/>
           </a:p>
@@ -1152,7 +1152,7 @@
           <a:p>
             <a:fld id="{545DE63F-B6A1-4286-98E5-30D0A12D3C8D}" type="datetimeFigureOut">
               <a:rPr lang="nl-NL" smtClean="0"/>
-              <a:t>2-12-2024</a:t>
+              <a:t>03-12-2024</a:t>
             </a:fld>
             <a:endParaRPr lang="nl-NL"/>
           </a:p>
@@ -1206,7 +1206,7 @@
           <a:p>
             <a:fld id="{D108F25D-CB0B-4DCB-B2CB-040B5AFE7CE3}" type="slidenum">
               <a:rPr lang="nl-NL" smtClean="0"/>
-              <a:t>‹nr.›</a:t>
+              <a:t>‹#›</a:t>
             </a:fld>
             <a:endParaRPr lang="nl-NL"/>
           </a:p>
@@ -1417,7 +1417,7 @@
           <a:p>
             <a:fld id="{545DE63F-B6A1-4286-98E5-30D0A12D3C8D}" type="datetimeFigureOut">
               <a:rPr lang="nl-NL" smtClean="0"/>
-              <a:t>2-12-2024</a:t>
+              <a:t>03-12-2024</a:t>
             </a:fld>
             <a:endParaRPr lang="nl-NL"/>
           </a:p>
@@ -1471,7 +1471,7 @@
           <a:p>
             <a:fld id="{D108F25D-CB0B-4DCB-B2CB-040B5AFE7CE3}" type="slidenum">
               <a:rPr lang="nl-NL" smtClean="0"/>
-              <a:t>‹nr.›</a:t>
+              <a:t>‹#›</a:t>
             </a:fld>
             <a:endParaRPr lang="nl-NL"/>
           </a:p>
@@ -1829,7 +1829,7 @@
           <a:p>
             <a:fld id="{545DE63F-B6A1-4286-98E5-30D0A12D3C8D}" type="datetimeFigureOut">
               <a:rPr lang="nl-NL" smtClean="0"/>
-              <a:t>2-12-2024</a:t>
+              <a:t>03-12-2024</a:t>
             </a:fld>
             <a:endParaRPr lang="nl-NL"/>
           </a:p>
@@ -1883,7 +1883,7 @@
           <a:p>
             <a:fld id="{D108F25D-CB0B-4DCB-B2CB-040B5AFE7CE3}" type="slidenum">
               <a:rPr lang="nl-NL" smtClean="0"/>
-              <a:t>‹nr.›</a:t>
+              <a:t>‹#›</a:t>
             </a:fld>
             <a:endParaRPr lang="nl-NL"/>
           </a:p>
@@ -1970,7 +1970,7 @@
           <a:p>
             <a:fld id="{545DE63F-B6A1-4286-98E5-30D0A12D3C8D}" type="datetimeFigureOut">
               <a:rPr lang="nl-NL" smtClean="0"/>
-              <a:t>2-12-2024</a:t>
+              <a:t>03-12-2024</a:t>
             </a:fld>
             <a:endParaRPr lang="nl-NL"/>
           </a:p>
@@ -2024,7 +2024,7 @@
           <a:p>
             <a:fld id="{D108F25D-CB0B-4DCB-B2CB-040B5AFE7CE3}" type="slidenum">
               <a:rPr lang="nl-NL" smtClean="0"/>
-              <a:t>‹nr.›</a:t>
+              <a:t>‹#›</a:t>
             </a:fld>
             <a:endParaRPr lang="nl-NL"/>
           </a:p>
@@ -2083,7 +2083,7 @@
           <a:p>
             <a:fld id="{545DE63F-B6A1-4286-98E5-30D0A12D3C8D}" type="datetimeFigureOut">
               <a:rPr lang="nl-NL" smtClean="0"/>
-              <a:t>2-12-2024</a:t>
+              <a:t>03-12-2024</a:t>
             </a:fld>
             <a:endParaRPr lang="nl-NL"/>
           </a:p>
@@ -2137,7 +2137,7 @@
           <a:p>
             <a:fld id="{D108F25D-CB0B-4DCB-B2CB-040B5AFE7CE3}" type="slidenum">
               <a:rPr lang="nl-NL" smtClean="0"/>
-              <a:t>‹nr.›</a:t>
+              <a:t>‹#›</a:t>
             </a:fld>
             <a:endParaRPr lang="nl-NL"/>
           </a:p>
@@ -2394,7 +2394,7 @@
           <a:p>
             <a:fld id="{545DE63F-B6A1-4286-98E5-30D0A12D3C8D}" type="datetimeFigureOut">
               <a:rPr lang="nl-NL" smtClean="0"/>
-              <a:t>2-12-2024</a:t>
+              <a:t>03-12-2024</a:t>
             </a:fld>
             <a:endParaRPr lang="nl-NL"/>
           </a:p>
@@ -2448,7 +2448,7 @@
           <a:p>
             <a:fld id="{D108F25D-CB0B-4DCB-B2CB-040B5AFE7CE3}" type="slidenum">
               <a:rPr lang="nl-NL" smtClean="0"/>
-              <a:t>‹nr.›</a:t>
+              <a:t>‹#›</a:t>
             </a:fld>
             <a:endParaRPr lang="nl-NL"/>
           </a:p>
@@ -2682,7 +2682,7 @@
           <a:p>
             <a:fld id="{545DE63F-B6A1-4286-98E5-30D0A12D3C8D}" type="datetimeFigureOut">
               <a:rPr lang="nl-NL" smtClean="0"/>
-              <a:t>2-12-2024</a:t>
+              <a:t>03-12-2024</a:t>
             </a:fld>
             <a:endParaRPr lang="nl-NL"/>
           </a:p>
@@ -2736,7 +2736,7 @@
           <a:p>
             <a:fld id="{D108F25D-CB0B-4DCB-B2CB-040B5AFE7CE3}" type="slidenum">
               <a:rPr lang="nl-NL" smtClean="0"/>
-              <a:t>‹nr.›</a:t>
+              <a:t>‹#›</a:t>
             </a:fld>
             <a:endParaRPr lang="nl-NL"/>
           </a:p>
@@ -2923,7 +2923,7 @@
           <a:p>
             <a:fld id="{545DE63F-B6A1-4286-98E5-30D0A12D3C8D}" type="datetimeFigureOut">
               <a:rPr lang="nl-NL" smtClean="0"/>
-              <a:t>2-12-2024</a:t>
+              <a:t>03-12-2024</a:t>
             </a:fld>
             <a:endParaRPr lang="nl-NL"/>
           </a:p>
@@ -3013,7 +3013,7 @@
           <a:p>
             <a:fld id="{D108F25D-CB0B-4DCB-B2CB-040B5AFE7CE3}" type="slidenum">
               <a:rPr lang="nl-NL" smtClean="0"/>
-              <a:t>‹nr.›</a:t>
+              <a:t>‹#›</a:t>
             </a:fld>
             <a:endParaRPr lang="nl-NL"/>
           </a:p>
@@ -3911,6 +3911,30 @@
               <a:t> branch</a:t>
             </a:r>
           </a:p>
+          <a:p>
+            <a:pPr lvl="1"/>
+            <a:r>
+              <a:rPr lang="en-US" dirty="0" err="1"/>
+              <a:t>Gebruik</a:t>
+            </a:r>
+            <a:r>
+              <a:rPr lang="en-US" dirty="0"/>
+              <a:t> </a:t>
+            </a:r>
+            <a:r>
+              <a:rPr lang="en-US" dirty="0" err="1"/>
+              <a:t>als</a:t>
+            </a:r>
+            <a:r>
+              <a:rPr lang="en-US" dirty="0"/>
+              <a:t> branch naam je eigen </a:t>
+            </a:r>
+            <a:r>
+              <a:rPr lang="en-US" dirty="0" err="1"/>
+              <a:t>voornaam</a:t>
+            </a:r>
+            <a:endParaRPr lang="en-US" dirty="0"/>
+          </a:p>
         </p:txBody>
       </p:sp>
     </p:spTree>
@@ -3995,12 +4019,12 @@
         <p:spPr>
           <a:xfrm>
             <a:off x="838200" y="1825625"/>
-            <a:ext cx="10515600" cy="1456055"/>
+            <a:ext cx="10515600" cy="1735183"/>
           </a:xfrm>
         </p:spPr>
         <p:txBody>
           <a:bodyPr>
-            <a:normAutofit fontScale="85000" lnSpcReduction="20000"/>
+            <a:normAutofit fontScale="92500" lnSpcReduction="20000"/>
           </a:bodyPr>
           <a:lstStyle/>
           <a:p>
@@ -4058,19 +4082,13 @@
             </a:r>
             <a:r>
               <a:rPr lang="en-US" dirty="0"/>
-              <a:t> de Assets toe </a:t>
-            </a:r>
-            <a:r>
-              <a:rPr lang="en-US" dirty="0" err="1"/>
-              <a:t>en</a:t>
-            </a:r>
-            <a:r>
-              <a:rPr lang="en-US" dirty="0"/>
-              <a:t> </a:t>
-            </a:r>
-            <a:r>
-              <a:rPr lang="en-US" dirty="0" err="1"/>
-              <a:t>plaats</a:t>
+              <a:t> de Assets toe</a:t>
+            </a:r>
+          </a:p>
+          <a:p>
+            <a:r>
+              <a:rPr lang="en-US" dirty="0" err="1"/>
+              <a:t>Plaats</a:t>
             </a:r>
             <a:r>
               <a:rPr lang="en-US" dirty="0"/>
@@ -4147,7 +4165,7 @@
         </p:blipFill>
         <p:spPr>
           <a:xfrm>
-            <a:off x="1097688" y="3667759"/>
+            <a:off x="6358177" y="3560808"/>
             <a:ext cx="5408475" cy="2932067"/>
           </a:xfrm>
           <a:prstGeom prst="rect">
@@ -4264,6 +4282,29 @@
             </a:r>
           </a:p>
           <a:p>
+            <a:pPr lvl="1"/>
+            <a:r>
+              <a:rPr lang="en-US" dirty="0"/>
+              <a:t>Als naam van de scene </a:t>
+            </a:r>
+            <a:r>
+              <a:rPr lang="en-US" dirty="0" err="1"/>
+              <a:t>gebruik</a:t>
+            </a:r>
+            <a:r>
+              <a:rPr lang="en-US" dirty="0"/>
+              <a:t> je </a:t>
+            </a:r>
+            <a:r>
+              <a:rPr lang="en-US" dirty="0" err="1"/>
+              <a:t>jouw</a:t>
+            </a:r>
+            <a:r>
+              <a:rPr lang="en-US" dirty="0"/>
+              <a:t> eigen naam</a:t>
+            </a:r>
+          </a:p>
+          <a:p>
             <a:r>
               <a:rPr lang="en-US" dirty="0"/>
               <a:t>Update </a:t>
@@ -4278,6 +4319,9 @@
             </a:r>
           </a:p>
           <a:p>
+            <a:pPr marL="0" indent="0">
+              <a:buNone/>
+            </a:pPr>
             <a:endParaRPr lang="en-US" dirty="0"/>
           </a:p>
           <a:p>
@@ -4341,15 +4385,7 @@
           <a:p>
             <a:r>
               <a:rPr lang="en-US" dirty="0"/>
-              <a:t>Lead developer </a:t>
-            </a:r>
-            <a:r>
-              <a:rPr lang="en-US" dirty="0" err="1"/>
-              <a:t>en</a:t>
-            </a:r>
-            <a:r>
-              <a:rPr lang="en-US" dirty="0"/>
-              <a:t> alle </a:t>
+              <a:t>Alle </a:t>
             </a:r>
             <a:r>
               <a:rPr lang="en-US" dirty="0" err="1"/>
@@ -4382,21 +4418,29 @@
           <a:p>
             <a:r>
               <a:rPr lang="en-US" dirty="0"/>
-              <a:t>Pull alle branches op de computer van de lead developer</a:t>
-            </a:r>
-          </a:p>
-          <a:p>
-            <a:r>
-              <a:rPr lang="en-US" dirty="0"/>
-              <a:t>Merge alle branches </a:t>
-            </a:r>
-            <a:r>
-              <a:rPr lang="en-US" dirty="0" err="1"/>
-              <a:t>naar</a:t>
-            </a:r>
-            <a:r>
-              <a:rPr lang="en-US" dirty="0"/>
-              <a:t> de branch main</a:t>
+              <a:t>Fetch alle branches ( git fetch )</a:t>
+            </a:r>
+          </a:p>
+          <a:p>
+            <a:r>
+              <a:rPr lang="en-US" dirty="0"/>
+              <a:t>Checkout van </a:t>
+            </a:r>
+            <a:r>
+              <a:rPr lang="en-US" dirty="0" err="1"/>
+              <a:t>elke</a:t>
+            </a:r>
+            <a:r>
+              <a:rPr lang="en-US" dirty="0"/>
+              <a:t> </a:t>
+            </a:r>
+            <a:r>
+              <a:rPr lang="en-US" dirty="0" err="1"/>
+              <a:t>teamgenoot</a:t>
+            </a:r>
+            <a:r>
+              <a:rPr lang="en-US" dirty="0"/>
+              <a:t> de branch</a:t>
             </a:r>
           </a:p>
           <a:p>
@@ -4410,42 +4454,41 @@
             </a:r>
             <a:r>
               <a:rPr lang="en-US" dirty="0"/>
-              <a:t> screenshot van het </a:t>
-            </a:r>
-            <a:r>
-              <a:rPr lang="en-US" dirty="0" err="1"/>
-              <a:t>eindproduct</a:t>
-            </a:r>
-            <a:endParaRPr lang="en-US" dirty="0"/>
-          </a:p>
-          <a:p>
-            <a:r>
-              <a:rPr lang="en-US" dirty="0"/>
-              <a:t>Save het </a:t>
-            </a:r>
-            <a:r>
-              <a:rPr lang="en-US" dirty="0" err="1"/>
-              <a:t>eindproduct</a:t>
-            </a:r>
-            <a:r>
-              <a:rPr lang="en-US" dirty="0"/>
-              <a:t> </a:t>
-            </a:r>
-            <a:r>
-              <a:rPr lang="en-US" dirty="0" err="1"/>
-              <a:t>en</a:t>
-            </a:r>
-            <a:r>
-              <a:rPr lang="en-US" dirty="0"/>
-              <a:t> push het </a:t>
-            </a:r>
-            <a:r>
-              <a:rPr lang="en-US" dirty="0" err="1"/>
-              <a:t>naar</a:t>
-            </a:r>
-            <a:r>
-              <a:rPr lang="en-US" dirty="0"/>
-              <a:t> GitHub </a:t>
+              <a:t> screenshot van het project van de </a:t>
+            </a:r>
+            <a:r>
+              <a:rPr lang="en-US" dirty="0" err="1"/>
+              <a:t>huidige</a:t>
+            </a:r>
+            <a:r>
+              <a:rPr lang="en-US" dirty="0"/>
+              <a:t> branch</a:t>
+            </a:r>
+          </a:p>
+          <a:p>
+            <a:r>
+              <a:rPr lang="en-US" dirty="0"/>
+              <a:t>Lever de branch </a:t>
+            </a:r>
+            <a:r>
+              <a:rPr lang="en-US" dirty="0" err="1"/>
+              <a:t>én</a:t>
+            </a:r>
+            <a:r>
+              <a:rPr lang="en-US" dirty="0"/>
+              <a:t> de </a:t>
+            </a:r>
+            <a:r>
+              <a:rPr lang="en-US" dirty="0" err="1"/>
+              <a:t>schreenshots</a:t>
+            </a:r>
+            <a:r>
+              <a:rPr lang="en-US" dirty="0"/>
+              <a:t> in in </a:t>
+            </a:r>
+            <a:r>
+              <a:rPr lang="en-US"/>
+              <a:t>Simulise</a:t>
             </a:r>
             <a:endParaRPr lang="nl-NL" dirty="0"/>
           </a:p>

</xml_diff>